<commit_message>
Features slide slightly updated
</commit_message>
<xml_diff>
--- a/MotionSenese/Presentation1.pptx
+++ b/MotionSenese/Presentation1.pptx
@@ -3858,7 +3858,7 @@
       </p:sp>
       <p:sp>
         <p:nvSpPr>
-          <p:cNvPr id="129" name="Each row is a labeled time snapshot with 12 features: attitude, gravity, acceleration, rotation (3 axes each)…"/>
+          <p:cNvPr id="129" name="Each row is a labeled time snapshot with 12 features: acceleration, rotation, gravity, attitude (3 axes each)…"/>
           <p:cNvSpPr txBox="1"/>
           <p:nvPr>
             <p:ph type="body" idx="1"/>
@@ -3890,34 +3890,6 @@
                   </a:schemeClr>
                 </a:solidFill>
               </a:rPr>
-              <a:t>attitude</a:t>
-            </a:r>
-            <a:r>
-              <a:t>, </a:t>
-            </a:r>
-            <a:r>
-              <a:rPr>
-                <a:solidFill>
-                  <a:schemeClr val="accent4">
-                    <a:hueOff val="-624705"/>
-                    <a:lumOff val="1372"/>
-                  </a:schemeClr>
-                </a:solidFill>
-              </a:rPr>
-              <a:t>gravity</a:t>
-            </a:r>
-            <a:r>
-              <a:t>, </a:t>
-            </a:r>
-            <a:r>
-              <a:rPr>
-                <a:solidFill>
-                  <a:schemeClr val="accent4">
-                    <a:hueOff val="-624705"/>
-                    <a:lumOff val="1372"/>
-                  </a:schemeClr>
-                </a:solidFill>
-              </a:rPr>
               <a:t>acceleration</a:t>
             </a:r>
             <a:r>
@@ -3933,6 +3905,34 @@
                 </a:solidFill>
               </a:rPr>
               <a:t>rotation</a:t>
+            </a:r>
+            <a:r>
+              <a:t>,</a:t>
+            </a:r>
+            <a:r>
+              <a:rPr>
+                <a:solidFill>
+                  <a:schemeClr val="accent4">
+                    <a:hueOff val="-624705"/>
+                    <a:lumOff val="1372"/>
+                  </a:schemeClr>
+                </a:solidFill>
+              </a:rPr>
+              <a:t> gravity</a:t>
+            </a:r>
+            <a:r>
+              <a:t>, </a:t>
+            </a:r>
+            <a:r>
+              <a:rPr>
+                <a:solidFill>
+                  <a:schemeClr val="accent4">
+                    <a:hueOff val="-624705"/>
+                    <a:lumOff val="1372"/>
+                  </a:schemeClr>
+                </a:solidFill>
+              </a:rPr>
+              <a:t>attitude</a:t>
             </a:r>
             <a:r>
               <a:t> (3 axes each)</a:t>
@@ -4613,9 +4613,9 @@
       </p:par>
     </p:tnLst>
     <p:bldLst>
-      <p:bldP build="whole" bldLvl="1" animBg="1" rev="0" advAuto="0" spid="134" grpId="1"/>
       <p:bldP build="whole" bldLvl="1" animBg="1" rev="0" advAuto="0" spid="135" grpId="2"/>
       <p:bldP build="whole" bldLvl="1" animBg="1" rev="0" advAuto="0" spid="136" grpId="3"/>
+      <p:bldP build="whole" bldLvl="1" animBg="1" rev="0" advAuto="0" spid="134" grpId="1"/>
     </p:bldLst>
   </p:timing>
 </p:sld>
@@ -4925,8 +4925,8 @@
       </p:par>
     </p:tnLst>
     <p:bldLst>
+      <p:bldP build="whole" bldLvl="1" animBg="1" rev="0" advAuto="0" spid="139" grpId="1"/>
       <p:bldP build="whole" bldLvl="1" animBg="1" rev="0" advAuto="0" spid="141" grpId="2"/>
-      <p:bldP build="whole" bldLvl="1" animBg="1" rev="0" advAuto="0" spid="139" grpId="1"/>
     </p:bldLst>
   </p:timing>
 </p:sld>

</xml_diff>